<commit_message>
Minor changes in wording.
</commit_message>
<xml_diff>
--- a/00. Introduction/00. Course introduction.pptx
+++ b/00. Introduction/00. Course introduction.pptx
@@ -219,7 +219,7 @@
           <a:p>
             <a:fld id="{59041DB8-B66F-4DC8-A96E-33677E0F90FF}" type="datetimeFigureOut">
               <a:rPr lang="en-US" smtClean="0"/>
-              <a:t>3/8/2015</a:t>
+              <a:t>3/9/2015</a:t>
             </a:fld>
             <a:endParaRPr lang="en-US"/>
           </a:p>
@@ -384,7 +384,7 @@
           <a:p>
             <a:fld id="{DEB49C4A-65AC-492D-9701-81B46C3AD0E4}" type="datetimeFigureOut">
               <a:rPr lang="en-US" smtClean="0"/>
-              <a:t>3/8/2015</a:t>
+              <a:t>3/9/2015</a:t>
             </a:fld>
             <a:endParaRPr lang="en-US"/>
           </a:p>
@@ -4906,7 +4906,7 @@
           <a:p>
             <a:fld id="{384A29A4-78C8-47AB-BA06-22CB45938951}" type="datetime1">
               <a:rPr lang="en-US" smtClean="0"/>
-              <a:t>3/8/2015</a:t>
+              <a:t>3/9/2015</a:t>
             </a:fld>
             <a:endParaRPr lang="en-US"/>
           </a:p>
@@ -5101,7 +5101,7 @@
           <a:p>
             <a:fld id="{E1ED4ACF-2D82-46F2-A8E9-23963AA34E86}" type="datetime1">
               <a:rPr lang="en-US" smtClean="0"/>
-              <a:t>3/8/2015</a:t>
+              <a:t>3/9/2015</a:t>
             </a:fld>
             <a:endParaRPr lang="en-US"/>
           </a:p>
@@ -5294,7 +5294,7 @@
           <a:p>
             <a:fld id="{AE374B5B-21A0-4192-BF4C-38187F1A68D8}" type="datetime1">
               <a:rPr lang="en-US" smtClean="0"/>
-              <a:t>3/8/2015</a:t>
+              <a:t>3/9/2015</a:t>
             </a:fld>
             <a:endParaRPr lang="en-US"/>
           </a:p>
@@ -5485,7 +5485,7 @@
           <a:p>
             <a:fld id="{AE374B5B-21A0-4192-BF4C-38187F1A68D8}" type="datetime1">
               <a:rPr lang="en-US" smtClean="0"/>
-              <a:t>3/8/2015</a:t>
+              <a:t>3/9/2015</a:t>
             </a:fld>
             <a:endParaRPr lang="en-US"/>
           </a:p>
@@ -7783,7 +7783,7 @@
           <a:p>
             <a:fld id="{33B5CF7C-B333-48E1-A4A6-83A3C8B73AC0}" type="datetime1">
               <a:rPr lang="en-US" smtClean="0"/>
-              <a:t>3/8/2015</a:t>
+              <a:t>3/9/2015</a:t>
             </a:fld>
             <a:endParaRPr lang="en-US"/>
           </a:p>
@@ -8238,7 +8238,7 @@
           <a:p>
             <a:fld id="{AE320762-5CBF-4210-AB54-376B091119F8}" type="datetime1">
               <a:rPr lang="en-US" smtClean="0"/>
-              <a:t>3/8/2015</a:t>
+              <a:t>3/9/2015</a:t>
             </a:fld>
             <a:endParaRPr lang="en-US"/>
           </a:p>
@@ -8371,7 +8371,7 @@
           <a:p>
             <a:fld id="{7F0DB371-BF5F-4058-A212-1A908E4D2674}" type="datetime1">
               <a:rPr lang="en-US" smtClean="0"/>
-              <a:t>3/8/2015</a:t>
+              <a:t>3/9/2015</a:t>
             </a:fld>
             <a:endParaRPr lang="en-US"/>
           </a:p>
@@ -10304,7 +10304,7 @@
           <a:p>
             <a:fld id="{60A4083B-90AA-48CF-BAD5-00AA24D7F288}" type="datetime1">
               <a:rPr lang="en-US" smtClean="0"/>
-              <a:t>3/8/2015</a:t>
+              <a:t>3/9/2015</a:t>
             </a:fld>
             <a:endParaRPr lang="en-US"/>
           </a:p>
@@ -14559,7 +14559,7 @@
           <a:p>
             <a:fld id="{B51B2453-8663-4C69-AF73-9FD7B1DEC5D0}" type="datetime1">
               <a:rPr lang="en-US" smtClean="0"/>
-              <a:t>3/8/2015</a:t>
+              <a:t>3/9/2015</a:t>
             </a:fld>
             <a:endParaRPr lang="en-US"/>
           </a:p>
@@ -15237,36 +15237,13 @@
           <a:p>
             <a:r>
               <a:rPr lang="en-US" dirty="0" smtClean="0"/>
-              <a:t>11+ years of experience in developing Java based solutions</a:t>
+              <a:t>11+ years of experience in developing Java based </a:t>
             </a:r>
-          </a:p>
-          <a:p>
             <a:r>
               <a:rPr lang="en-US" dirty="0" smtClean="0"/>
-              <a:t>Interests:</a:t>
+              <a:t>solutions</a:t>
             </a:r>
-          </a:p>
-          <a:p>
-            <a:pPr lvl="1"/>
-            <a:r>
-              <a:rPr lang="en-US" dirty="0" smtClean="0"/>
-              <a:t>Software design patterns</a:t>
-            </a:r>
-          </a:p>
-          <a:p>
-            <a:pPr lvl="1"/>
-            <a:r>
-              <a:rPr lang="en-US" dirty="0" smtClean="0"/>
-              <a:t>Modular architectures</a:t>
-            </a:r>
-          </a:p>
-          <a:p>
-            <a:pPr lvl="1"/>
-            <a:r>
-              <a:rPr lang="en-US" dirty="0" smtClean="0"/>
-              <a:t>Automated testing</a:t>
-            </a:r>
-            <a:endParaRPr lang="en-US" dirty="0"/>
+            <a:endParaRPr lang="en-US" dirty="0" smtClean="0"/>
           </a:p>
         </p:txBody>
       </p:sp>
@@ -15362,11 +15339,7 @@
             <a:pPr lvl="1"/>
             <a:r>
               <a:rPr lang="en-US" dirty="0" smtClean="0"/>
-              <a:t>Java Standard </a:t>
-            </a:r>
-            <a:r>
-              <a:rPr lang="en-US" dirty="0" smtClean="0"/>
-              <a:t>Edition</a:t>
+              <a:t>Java Standard Edition</a:t>
             </a:r>
           </a:p>
           <a:p>
@@ -15375,7 +15348,6 @@
               <a:rPr lang="en-US" dirty="0" smtClean="0"/>
               <a:t>OOP</a:t>
             </a:r>
-            <a:endParaRPr lang="en-US" dirty="0" smtClean="0"/>
           </a:p>
           <a:p>
             <a:r>
@@ -15492,11 +15464,7 @@
           <a:p>
             <a:r>
               <a:rPr lang="en-US" dirty="0" smtClean="0"/>
-              <a:t>50% theory, 50% </a:t>
-            </a:r>
-            <a:r>
-              <a:rPr lang="en-US" dirty="0" smtClean="0"/>
-              <a:t>practice</a:t>
+              <a:t>50% theory, 50% hands-on</a:t>
             </a:r>
           </a:p>
           <a:p>
@@ -15705,13 +15673,38 @@
           <a:p>
             <a:r>
               <a:rPr lang="en-US" dirty="0" smtClean="0"/>
-              <a:t>Your experience with software development so far?</a:t>
+              <a:t>Experience </a:t>
             </a:r>
+            <a:r>
+              <a:rPr lang="en-US" dirty="0" smtClean="0"/>
+              <a:t>with </a:t>
+            </a:r>
+            <a:r>
+              <a:rPr lang="en-US" dirty="0" smtClean="0"/>
+              <a:t>(</a:t>
+            </a:r>
+            <a:r>
+              <a:rPr lang="en-US" dirty="0" smtClean="0"/>
+              <a:t>Java) </a:t>
+            </a:r>
+            <a:r>
+              <a:rPr lang="en-US" dirty="0" smtClean="0"/>
+              <a:t>software development?</a:t>
+            </a:r>
+            <a:endParaRPr lang="en-US" dirty="0" smtClean="0"/>
           </a:p>
           <a:p>
             <a:r>
               <a:rPr lang="en-US" dirty="0" smtClean="0"/>
-              <a:t>Your expectations from this course?</a:t>
+              <a:t>Expectations </a:t>
+            </a:r>
+            <a:r>
+              <a:rPr lang="en-US" dirty="0" smtClean="0"/>
+              <a:t>from this </a:t>
+            </a:r>
+            <a:r>
+              <a:rPr lang="en-US" dirty="0" smtClean="0"/>
+              <a:t>course?</a:t>
             </a:r>
             <a:endParaRPr lang="en-US" dirty="0"/>
           </a:p>

</xml_diff>